<commit_message>
General fixes to report + demos and readme + continue powerpoint
</commit_message>
<xml_diff>
--- a/Pereira_Martins_Filipe_Controle_De_Jobs.pptx
+++ b/Pereira_Martins_Filipe_Controle_De_Jobs.pptx
@@ -5,7 +5,7 @@
     <p:sldMasterId id="2147483736" r:id="rId1"/>
   </p:sldMasterIdLst>
   <p:notesMasterIdLst>
-    <p:notesMasterId r:id="rId17"/>
+    <p:notesMasterId r:id="rId22"/>
   </p:notesMasterIdLst>
   <p:sldIdLst>
     <p:sldId id="256" r:id="rId2"/>
@@ -23,6 +23,11 @@
     <p:sldId id="268" r:id="rId14"/>
     <p:sldId id="269" r:id="rId15"/>
     <p:sldId id="270" r:id="rId16"/>
+    <p:sldId id="271" r:id="rId17"/>
+    <p:sldId id="272" r:id="rId18"/>
+    <p:sldId id="273" r:id="rId19"/>
+    <p:sldId id="274" r:id="rId20"/>
+    <p:sldId id="275" r:id="rId21"/>
   </p:sldIdLst>
   <p:sldSz cx="12192000" cy="6858000"/>
   <p:notesSz cx="6858000" cy="9144000"/>
@@ -6775,7 +6780,7 @@
           <a:p>
             <a:r>
               <a:rPr lang="fr-FR" sz="5000" dirty="0"/>
-              <a:t>SIGHUP</a:t>
+              <a:t>SIGHUP (1/5)</a:t>
             </a:r>
             <a:endParaRPr lang="fr-BE" sz="5000" dirty="0"/>
           </a:p>
@@ -6797,12 +6802,63 @@
             <p:ph idx="1"/>
           </p:nvPr>
         </p:nvSpPr>
-        <p:spPr/>
+        <p:spPr>
+          <a:xfrm>
+            <a:off x="1088136" y="2384473"/>
+            <a:ext cx="9922764" cy="3838722"/>
+          </a:xfrm>
+        </p:spPr>
         <p:txBody>
           <a:bodyPr/>
           <a:lstStyle/>
           <a:p>
-            <a:endParaRPr lang="fr-BE"/>
+            <a:r>
+              <a:rPr lang="fr-FR" sz="2500" dirty="0"/>
+              <a:t>Perte de connexion au terminal</a:t>
+            </a:r>
+          </a:p>
+          <a:p>
+            <a:r>
+              <a:rPr lang="fr-FR" sz="2500" dirty="0"/>
+              <a:t>Signaler l’événement ?</a:t>
+            </a:r>
+          </a:p>
+          <a:p>
+            <a:r>
+              <a:rPr lang="fr-FR" sz="2500" dirty="0"/>
+              <a:t>Shell =&gt; Réaction en chaine </a:t>
+            </a:r>
+          </a:p>
+          <a:p>
+            <a:r>
+              <a:rPr lang="fr-FR" sz="2500" u="sng" dirty="0">
+                <a:solidFill>
+                  <a:srgbClr val="FF0000"/>
+                </a:solidFill>
+              </a:rPr>
+              <a:t>Sauf les groupes non créés</a:t>
+            </a:r>
+          </a:p>
+          <a:p>
+            <a:r>
+              <a:rPr lang="fr-FR" sz="2500" dirty="0"/>
+              <a:t>SIGCONT (réactiver)</a:t>
+            </a:r>
+          </a:p>
+          <a:p>
+            <a:r>
+              <a:rPr lang="fr-FR" sz="2500" u="sng" dirty="0"/>
+              <a:t>Démonstration</a:t>
+            </a:r>
+          </a:p>
+          <a:p>
+            <a:endParaRPr lang="fr-FR" sz="2500" dirty="0"/>
+          </a:p>
+          <a:p>
+            <a:endParaRPr lang="fr-FR" dirty="0"/>
+          </a:p>
+          <a:p>
+            <a:endParaRPr lang="fr-BE" dirty="0"/>
           </a:p>
         </p:txBody>
       </p:sp>
@@ -6902,6 +6958,1997 @@
   <p:clrMapOvr>
     <a:masterClrMapping/>
   </p:clrMapOvr>
+  <p:timing>
+    <p:tnLst>
+      <p:par>
+        <p:cTn id="1" dur="indefinite" restart="never" nodeType="tmRoot">
+          <p:childTnLst>
+            <p:seq concurrent="1" nextAc="seek">
+              <p:cTn id="2" dur="indefinite" nodeType="mainSeq">
+                <p:childTnLst>
+                  <p:par>
+                    <p:cTn id="3" fill="hold">
+                      <p:stCondLst>
+                        <p:cond delay="indefinite"/>
+                      </p:stCondLst>
+                      <p:childTnLst>
+                        <p:par>
+                          <p:cTn id="4" fill="hold">
+                            <p:stCondLst>
+                              <p:cond delay="0"/>
+                            </p:stCondLst>
+                            <p:childTnLst>
+                              <p:par>
+                                <p:cTn id="5" presetID="1" presetClass="entr" presetSubtype="0" fill="hold" grpId="0" nodeType="clickEffect">
+                                  <p:stCondLst>
+                                    <p:cond delay="0"/>
+                                  </p:stCondLst>
+                                  <p:childTnLst>
+                                    <p:set>
+                                      <p:cBhvr>
+                                        <p:cTn id="6" dur="1" fill="hold">
+                                          <p:stCondLst>
+                                            <p:cond delay="0"/>
+                                          </p:stCondLst>
+                                        </p:cTn>
+                                        <p:tgtEl>
+                                          <p:spTgt spid="3">
+                                            <p:txEl>
+                                              <p:pRg st="0" end="0"/>
+                                            </p:txEl>
+                                          </p:spTgt>
+                                        </p:tgtEl>
+                                        <p:attrNameLst>
+                                          <p:attrName>style.visibility</p:attrName>
+                                        </p:attrNameLst>
+                                      </p:cBhvr>
+                                      <p:to>
+                                        <p:strVal val="visible"/>
+                                      </p:to>
+                                    </p:set>
+                                  </p:childTnLst>
+                                </p:cTn>
+                              </p:par>
+                            </p:childTnLst>
+                          </p:cTn>
+                        </p:par>
+                      </p:childTnLst>
+                    </p:cTn>
+                  </p:par>
+                  <p:par>
+                    <p:cTn id="7" fill="hold">
+                      <p:stCondLst>
+                        <p:cond delay="indefinite"/>
+                      </p:stCondLst>
+                      <p:childTnLst>
+                        <p:par>
+                          <p:cTn id="8" fill="hold">
+                            <p:stCondLst>
+                              <p:cond delay="0"/>
+                            </p:stCondLst>
+                            <p:childTnLst>
+                              <p:par>
+                                <p:cTn id="9" presetID="1" presetClass="entr" presetSubtype="0" fill="hold" grpId="0" nodeType="clickEffect">
+                                  <p:stCondLst>
+                                    <p:cond delay="0"/>
+                                  </p:stCondLst>
+                                  <p:childTnLst>
+                                    <p:set>
+                                      <p:cBhvr>
+                                        <p:cTn id="10" dur="1" fill="hold">
+                                          <p:stCondLst>
+                                            <p:cond delay="0"/>
+                                          </p:stCondLst>
+                                        </p:cTn>
+                                        <p:tgtEl>
+                                          <p:spTgt spid="3">
+                                            <p:txEl>
+                                              <p:pRg st="1" end="1"/>
+                                            </p:txEl>
+                                          </p:spTgt>
+                                        </p:tgtEl>
+                                        <p:attrNameLst>
+                                          <p:attrName>style.visibility</p:attrName>
+                                        </p:attrNameLst>
+                                      </p:cBhvr>
+                                      <p:to>
+                                        <p:strVal val="visible"/>
+                                      </p:to>
+                                    </p:set>
+                                  </p:childTnLst>
+                                </p:cTn>
+                              </p:par>
+                            </p:childTnLst>
+                          </p:cTn>
+                        </p:par>
+                      </p:childTnLst>
+                    </p:cTn>
+                  </p:par>
+                  <p:par>
+                    <p:cTn id="11" fill="hold">
+                      <p:stCondLst>
+                        <p:cond delay="indefinite"/>
+                      </p:stCondLst>
+                      <p:childTnLst>
+                        <p:par>
+                          <p:cTn id="12" fill="hold">
+                            <p:stCondLst>
+                              <p:cond delay="0"/>
+                            </p:stCondLst>
+                            <p:childTnLst>
+                              <p:par>
+                                <p:cTn id="13" presetID="1" presetClass="entr" presetSubtype="0" fill="hold" grpId="0" nodeType="clickEffect">
+                                  <p:stCondLst>
+                                    <p:cond delay="0"/>
+                                  </p:stCondLst>
+                                  <p:childTnLst>
+                                    <p:set>
+                                      <p:cBhvr>
+                                        <p:cTn id="14" dur="1" fill="hold">
+                                          <p:stCondLst>
+                                            <p:cond delay="0"/>
+                                          </p:stCondLst>
+                                        </p:cTn>
+                                        <p:tgtEl>
+                                          <p:spTgt spid="3">
+                                            <p:txEl>
+                                              <p:pRg st="2" end="2"/>
+                                            </p:txEl>
+                                          </p:spTgt>
+                                        </p:tgtEl>
+                                        <p:attrNameLst>
+                                          <p:attrName>style.visibility</p:attrName>
+                                        </p:attrNameLst>
+                                      </p:cBhvr>
+                                      <p:to>
+                                        <p:strVal val="visible"/>
+                                      </p:to>
+                                    </p:set>
+                                  </p:childTnLst>
+                                </p:cTn>
+                              </p:par>
+                            </p:childTnLst>
+                          </p:cTn>
+                        </p:par>
+                      </p:childTnLst>
+                    </p:cTn>
+                  </p:par>
+                  <p:par>
+                    <p:cTn id="15" fill="hold">
+                      <p:stCondLst>
+                        <p:cond delay="indefinite"/>
+                      </p:stCondLst>
+                      <p:childTnLst>
+                        <p:par>
+                          <p:cTn id="16" fill="hold">
+                            <p:stCondLst>
+                              <p:cond delay="0"/>
+                            </p:stCondLst>
+                            <p:childTnLst>
+                              <p:par>
+                                <p:cTn id="17" presetID="1" presetClass="entr" presetSubtype="0" fill="hold" grpId="0" nodeType="clickEffect">
+                                  <p:stCondLst>
+                                    <p:cond delay="0"/>
+                                  </p:stCondLst>
+                                  <p:childTnLst>
+                                    <p:set>
+                                      <p:cBhvr>
+                                        <p:cTn id="18" dur="1" fill="hold">
+                                          <p:stCondLst>
+                                            <p:cond delay="0"/>
+                                          </p:stCondLst>
+                                        </p:cTn>
+                                        <p:tgtEl>
+                                          <p:spTgt spid="3">
+                                            <p:txEl>
+                                              <p:pRg st="3" end="3"/>
+                                            </p:txEl>
+                                          </p:spTgt>
+                                        </p:tgtEl>
+                                        <p:attrNameLst>
+                                          <p:attrName>style.visibility</p:attrName>
+                                        </p:attrNameLst>
+                                      </p:cBhvr>
+                                      <p:to>
+                                        <p:strVal val="visible"/>
+                                      </p:to>
+                                    </p:set>
+                                  </p:childTnLst>
+                                </p:cTn>
+                              </p:par>
+                            </p:childTnLst>
+                          </p:cTn>
+                        </p:par>
+                      </p:childTnLst>
+                    </p:cTn>
+                  </p:par>
+                  <p:par>
+                    <p:cTn id="19" fill="hold">
+                      <p:stCondLst>
+                        <p:cond delay="indefinite"/>
+                      </p:stCondLst>
+                      <p:childTnLst>
+                        <p:par>
+                          <p:cTn id="20" fill="hold">
+                            <p:stCondLst>
+                              <p:cond delay="0"/>
+                            </p:stCondLst>
+                            <p:childTnLst>
+                              <p:par>
+                                <p:cTn id="21" presetID="1" presetClass="entr" presetSubtype="0" fill="hold" grpId="0" nodeType="clickEffect">
+                                  <p:stCondLst>
+                                    <p:cond delay="0"/>
+                                  </p:stCondLst>
+                                  <p:childTnLst>
+                                    <p:set>
+                                      <p:cBhvr>
+                                        <p:cTn id="22" dur="1" fill="hold">
+                                          <p:stCondLst>
+                                            <p:cond delay="0"/>
+                                          </p:stCondLst>
+                                        </p:cTn>
+                                        <p:tgtEl>
+                                          <p:spTgt spid="3">
+                                            <p:txEl>
+                                              <p:pRg st="4" end="4"/>
+                                            </p:txEl>
+                                          </p:spTgt>
+                                        </p:tgtEl>
+                                        <p:attrNameLst>
+                                          <p:attrName>style.visibility</p:attrName>
+                                        </p:attrNameLst>
+                                      </p:cBhvr>
+                                      <p:to>
+                                        <p:strVal val="visible"/>
+                                      </p:to>
+                                    </p:set>
+                                  </p:childTnLst>
+                                </p:cTn>
+                              </p:par>
+                            </p:childTnLst>
+                          </p:cTn>
+                        </p:par>
+                      </p:childTnLst>
+                    </p:cTn>
+                  </p:par>
+                  <p:par>
+                    <p:cTn id="23" fill="hold">
+                      <p:stCondLst>
+                        <p:cond delay="indefinite"/>
+                      </p:stCondLst>
+                      <p:childTnLst>
+                        <p:par>
+                          <p:cTn id="24" fill="hold">
+                            <p:stCondLst>
+                              <p:cond delay="0"/>
+                            </p:stCondLst>
+                            <p:childTnLst>
+                              <p:par>
+                                <p:cTn id="25" presetID="1" presetClass="entr" presetSubtype="0" fill="hold" grpId="0" nodeType="clickEffect">
+                                  <p:stCondLst>
+                                    <p:cond delay="0"/>
+                                  </p:stCondLst>
+                                  <p:childTnLst>
+                                    <p:set>
+                                      <p:cBhvr>
+                                        <p:cTn id="26" dur="1" fill="hold">
+                                          <p:stCondLst>
+                                            <p:cond delay="0"/>
+                                          </p:stCondLst>
+                                        </p:cTn>
+                                        <p:tgtEl>
+                                          <p:spTgt spid="3">
+                                            <p:txEl>
+                                              <p:pRg st="5" end="5"/>
+                                            </p:txEl>
+                                          </p:spTgt>
+                                        </p:tgtEl>
+                                        <p:attrNameLst>
+                                          <p:attrName>style.visibility</p:attrName>
+                                        </p:attrNameLst>
+                                      </p:cBhvr>
+                                      <p:to>
+                                        <p:strVal val="visible"/>
+                                      </p:to>
+                                    </p:set>
+                                  </p:childTnLst>
+                                </p:cTn>
+                              </p:par>
+                            </p:childTnLst>
+                          </p:cTn>
+                        </p:par>
+                      </p:childTnLst>
+                    </p:cTn>
+                  </p:par>
+                </p:childTnLst>
+              </p:cTn>
+              <p:prevCondLst>
+                <p:cond evt="onPrev" delay="0">
+                  <p:tgtEl>
+                    <p:sldTgt/>
+                  </p:tgtEl>
+                </p:cond>
+              </p:prevCondLst>
+              <p:nextCondLst>
+                <p:cond evt="onNext" delay="0">
+                  <p:tgtEl>
+                    <p:sldTgt/>
+                  </p:tgtEl>
+                </p:cond>
+              </p:nextCondLst>
+            </p:seq>
+          </p:childTnLst>
+        </p:cTn>
+      </p:par>
+    </p:tnLst>
+    <p:bldLst>
+      <p:bldP spid="3" grpId="0" build="p"/>
+    </p:bldLst>
+  </p:timing>
+</p:sld>
+</file>
+
+<file path=ppt/slides/slide16.xml><?xml version="1.0" encoding="utf-8"?>
+<p:sld xmlns:a="http://schemas.openxmlformats.org/drawingml/2006/main" xmlns:r="http://schemas.openxmlformats.org/officeDocument/2006/relationships" xmlns:p="http://schemas.openxmlformats.org/presentationml/2006/main">
+  <p:cSld>
+    <p:spTree>
+      <p:nvGrpSpPr>
+        <p:cNvPr id="1" name=""/>
+        <p:cNvGrpSpPr/>
+        <p:nvPr/>
+      </p:nvGrpSpPr>
+      <p:grpSpPr>
+        <a:xfrm>
+          <a:off x="0" y="0"/>
+          <a:ext cx="0" cy="0"/>
+          <a:chOff x="0" y="0"/>
+          <a:chExt cx="0" cy="0"/>
+        </a:xfrm>
+      </p:grpSpPr>
+      <p:sp>
+        <p:nvSpPr>
+          <p:cNvPr id="2" name="Titre 1">
+            <a:extLst>
+              <a:ext uri="{FF2B5EF4-FFF2-40B4-BE49-F238E27FC236}">
+                <a16:creationId xmlns:a16="http://schemas.microsoft.com/office/drawing/2014/main" id="{362488C1-E36B-A371-CB2A-A153C8A717BF}"/>
+              </a:ext>
+            </a:extLst>
+          </p:cNvPr>
+          <p:cNvSpPr>
+            <a:spLocks noGrp="1"/>
+          </p:cNvSpPr>
+          <p:nvPr>
+            <p:ph type="title"/>
+          </p:nvPr>
+        </p:nvSpPr>
+        <p:spPr/>
+        <p:txBody>
+          <a:bodyPr/>
+          <a:lstStyle/>
+          <a:p>
+            <a:r>
+              <a:rPr kumimoji="0" lang="fr-FR" sz="5000" b="1" i="0" u="none" strike="noStrike" kern="1200" cap="none" spc="0" normalizeH="0" baseline="0" noProof="0" dirty="0">
+                <a:ln>
+                  <a:noFill/>
+                </a:ln>
+                <a:solidFill>
+                  <a:prstClr val="black"/>
+                </a:solidFill>
+                <a:effectLst/>
+                <a:uLnTx/>
+                <a:uFillTx/>
+                <a:latin typeface="Neue Haas Grotesk Text Pro"/>
+                <a:ea typeface="+mj-ea"/>
+                <a:cs typeface="+mj-cs"/>
+              </a:rPr>
+              <a:t>SIGHUP (2/5)</a:t>
+            </a:r>
+            <a:endParaRPr lang="fr-BE" dirty="0"/>
+          </a:p>
+        </p:txBody>
+      </p:sp>
+      <p:sp>
+        <p:nvSpPr>
+          <p:cNvPr id="3" name="Espace réservé du contenu 2">
+            <a:extLst>
+              <a:ext uri="{FF2B5EF4-FFF2-40B4-BE49-F238E27FC236}">
+                <a16:creationId xmlns:a16="http://schemas.microsoft.com/office/drawing/2014/main" id="{D4064399-2A51-6EF7-625A-679A65363DA4}"/>
+              </a:ext>
+            </a:extLst>
+          </p:cNvPr>
+          <p:cNvSpPr>
+            <a:spLocks noGrp="1"/>
+          </p:cNvSpPr>
+          <p:nvPr>
+            <p:ph idx="1"/>
+          </p:nvPr>
+        </p:nvSpPr>
+        <p:spPr/>
+        <p:txBody>
+          <a:bodyPr>
+            <a:normAutofit/>
+          </a:bodyPr>
+          <a:lstStyle/>
+          <a:p>
+            <a:r>
+              <a:rPr lang="fr-BE" sz="2500" dirty="0"/>
+              <a:t>Groupes de processus orphelins</a:t>
+            </a:r>
+          </a:p>
+          <a:p>
+            <a:pPr lvl="1"/>
+            <a:r>
+              <a:rPr lang="fr-BE" sz="2500" dirty="0"/>
+              <a:t>Groupe sans leader</a:t>
+            </a:r>
+          </a:p>
+          <a:p>
+            <a:pPr lvl="1"/>
+            <a:r>
+              <a:rPr lang="fr-FR" sz="2500" dirty="0"/>
+              <a:t>Aucune supervision sur les membres</a:t>
+            </a:r>
+          </a:p>
+          <a:p>
+            <a:pPr lvl="1"/>
+            <a:r>
+              <a:rPr lang="fr-FR" sz="2500" dirty="0"/>
+              <a:t>Et s’ils sont stoppés ?</a:t>
+            </a:r>
+          </a:p>
+          <a:p>
+            <a:pPr lvl="1"/>
+            <a:r>
+              <a:rPr lang="fr-FR" sz="2500" dirty="0"/>
+              <a:t>SIGHUP + SIGCONT</a:t>
+            </a:r>
+          </a:p>
+          <a:p>
+            <a:pPr lvl="1"/>
+            <a:r>
+              <a:rPr lang="fr-FR" sz="2500" u="sng" dirty="0"/>
+              <a:t>Démonstration</a:t>
+            </a:r>
+          </a:p>
+          <a:p>
+            <a:pPr lvl="1"/>
+            <a:endParaRPr lang="fr-BE" sz="2500" dirty="0"/>
+          </a:p>
+        </p:txBody>
+      </p:sp>
+      <p:sp>
+        <p:nvSpPr>
+          <p:cNvPr id="4" name="Espace réservé de la date 3">
+            <a:extLst>
+              <a:ext uri="{FF2B5EF4-FFF2-40B4-BE49-F238E27FC236}">
+                <a16:creationId xmlns:a16="http://schemas.microsoft.com/office/drawing/2014/main" id="{E9601697-7785-2982-7DA7-C73C7A94481E}"/>
+              </a:ext>
+            </a:extLst>
+          </p:cNvPr>
+          <p:cNvSpPr>
+            <a:spLocks noGrp="1"/>
+          </p:cNvSpPr>
+          <p:nvPr>
+            <p:ph type="dt" sz="half" idx="10"/>
+          </p:nvPr>
+        </p:nvSpPr>
+        <p:spPr/>
+        <p:txBody>
+          <a:bodyPr/>
+          <a:lstStyle/>
+          <a:p>
+            <a:fld id="{37AD5F8E-F96A-4AFD-A571-9DF5FE5D3317}" type="datetime1">
+              <a:rPr lang="fr-BE" smtClean="0"/>
+              <a:t>06-12-23</a:t>
+            </a:fld>
+            <a:endParaRPr lang="en-US"/>
+          </a:p>
+        </p:txBody>
+      </p:sp>
+      <p:sp>
+        <p:nvSpPr>
+          <p:cNvPr id="5" name="Espace réservé du pied de page 4">
+            <a:extLst>
+              <a:ext uri="{FF2B5EF4-FFF2-40B4-BE49-F238E27FC236}">
+                <a16:creationId xmlns:a16="http://schemas.microsoft.com/office/drawing/2014/main" id="{28B0C638-5A14-4904-FF2A-500B67EB04C6}"/>
+              </a:ext>
+            </a:extLst>
+          </p:cNvPr>
+          <p:cNvSpPr>
+            <a:spLocks noGrp="1"/>
+          </p:cNvSpPr>
+          <p:nvPr>
+            <p:ph type="ftr" sz="quarter" idx="11"/>
+          </p:nvPr>
+        </p:nvSpPr>
+        <p:spPr/>
+        <p:txBody>
+          <a:bodyPr/>
+          <a:lstStyle/>
+          <a:p>
+            <a:r>
+              <a:rPr lang="en-US" dirty="0"/>
+              <a:t>58093@etu.he2b.be</a:t>
+            </a:r>
+          </a:p>
+        </p:txBody>
+      </p:sp>
+      <p:sp>
+        <p:nvSpPr>
+          <p:cNvPr id="6" name="Espace réservé du numéro de diapositive 5">
+            <a:extLst>
+              <a:ext uri="{FF2B5EF4-FFF2-40B4-BE49-F238E27FC236}">
+                <a16:creationId xmlns:a16="http://schemas.microsoft.com/office/drawing/2014/main" id="{D807722E-7FCB-F62E-7DE7-4751511944C6}"/>
+              </a:ext>
+            </a:extLst>
+          </p:cNvPr>
+          <p:cNvSpPr>
+            <a:spLocks noGrp="1"/>
+          </p:cNvSpPr>
+          <p:nvPr>
+            <p:ph type="sldNum" sz="quarter" idx="12"/>
+          </p:nvPr>
+        </p:nvSpPr>
+        <p:spPr/>
+        <p:txBody>
+          <a:bodyPr/>
+          <a:lstStyle/>
+          <a:p>
+            <a:fld id="{719D7796-F675-488F-AC46-C88938C80352}" type="slidenum">
+              <a:rPr lang="en-US" smtClean="0"/>
+              <a:t>16</a:t>
+            </a:fld>
+            <a:endParaRPr lang="en-US"/>
+          </a:p>
+        </p:txBody>
+      </p:sp>
+    </p:spTree>
+    <p:extLst>
+      <p:ext uri="{BB962C8B-B14F-4D97-AF65-F5344CB8AC3E}">
+        <p14:creationId xmlns:p14="http://schemas.microsoft.com/office/powerpoint/2010/main" val="3440030594"/>
+      </p:ext>
+    </p:extLst>
+  </p:cSld>
+  <p:clrMapOvr>
+    <a:masterClrMapping/>
+  </p:clrMapOvr>
+  <p:timing>
+    <p:tnLst>
+      <p:par>
+        <p:cTn id="1" dur="indefinite" restart="never" nodeType="tmRoot">
+          <p:childTnLst>
+            <p:seq concurrent="1" nextAc="seek">
+              <p:cTn id="2" dur="indefinite" nodeType="mainSeq">
+                <p:childTnLst>
+                  <p:par>
+                    <p:cTn id="3" fill="hold">
+                      <p:stCondLst>
+                        <p:cond delay="indefinite"/>
+                      </p:stCondLst>
+                      <p:childTnLst>
+                        <p:par>
+                          <p:cTn id="4" fill="hold">
+                            <p:stCondLst>
+                              <p:cond delay="0"/>
+                            </p:stCondLst>
+                            <p:childTnLst>
+                              <p:par>
+                                <p:cTn id="5" presetID="1" presetClass="entr" presetSubtype="0" fill="hold" nodeType="clickEffect">
+                                  <p:stCondLst>
+                                    <p:cond delay="0"/>
+                                  </p:stCondLst>
+                                  <p:childTnLst>
+                                    <p:set>
+                                      <p:cBhvr>
+                                        <p:cTn id="6" dur="1" fill="hold">
+                                          <p:stCondLst>
+                                            <p:cond delay="0"/>
+                                          </p:stCondLst>
+                                        </p:cTn>
+                                        <p:tgtEl>
+                                          <p:spTgt spid="3">
+                                            <p:txEl>
+                                              <p:pRg st="0" end="0"/>
+                                            </p:txEl>
+                                          </p:spTgt>
+                                        </p:tgtEl>
+                                        <p:attrNameLst>
+                                          <p:attrName>style.visibility</p:attrName>
+                                        </p:attrNameLst>
+                                      </p:cBhvr>
+                                      <p:to>
+                                        <p:strVal val="visible"/>
+                                      </p:to>
+                                    </p:set>
+                                  </p:childTnLst>
+                                </p:cTn>
+                              </p:par>
+                            </p:childTnLst>
+                          </p:cTn>
+                        </p:par>
+                      </p:childTnLst>
+                    </p:cTn>
+                  </p:par>
+                  <p:par>
+                    <p:cTn id="7" fill="hold">
+                      <p:stCondLst>
+                        <p:cond delay="indefinite"/>
+                      </p:stCondLst>
+                      <p:childTnLst>
+                        <p:par>
+                          <p:cTn id="8" fill="hold">
+                            <p:stCondLst>
+                              <p:cond delay="0"/>
+                            </p:stCondLst>
+                            <p:childTnLst>
+                              <p:par>
+                                <p:cTn id="9" presetID="1" presetClass="entr" presetSubtype="0" fill="hold" nodeType="clickEffect">
+                                  <p:stCondLst>
+                                    <p:cond delay="0"/>
+                                  </p:stCondLst>
+                                  <p:childTnLst>
+                                    <p:set>
+                                      <p:cBhvr>
+                                        <p:cTn id="10" dur="1" fill="hold">
+                                          <p:stCondLst>
+                                            <p:cond delay="0"/>
+                                          </p:stCondLst>
+                                        </p:cTn>
+                                        <p:tgtEl>
+                                          <p:spTgt spid="3">
+                                            <p:txEl>
+                                              <p:pRg st="1" end="1"/>
+                                            </p:txEl>
+                                          </p:spTgt>
+                                        </p:tgtEl>
+                                        <p:attrNameLst>
+                                          <p:attrName>style.visibility</p:attrName>
+                                        </p:attrNameLst>
+                                      </p:cBhvr>
+                                      <p:to>
+                                        <p:strVal val="visible"/>
+                                      </p:to>
+                                    </p:set>
+                                  </p:childTnLst>
+                                </p:cTn>
+                              </p:par>
+                            </p:childTnLst>
+                          </p:cTn>
+                        </p:par>
+                      </p:childTnLst>
+                    </p:cTn>
+                  </p:par>
+                  <p:par>
+                    <p:cTn id="11" fill="hold">
+                      <p:stCondLst>
+                        <p:cond delay="indefinite"/>
+                      </p:stCondLst>
+                      <p:childTnLst>
+                        <p:par>
+                          <p:cTn id="12" fill="hold">
+                            <p:stCondLst>
+                              <p:cond delay="0"/>
+                            </p:stCondLst>
+                            <p:childTnLst>
+                              <p:par>
+                                <p:cTn id="13" presetID="1" presetClass="entr" presetSubtype="0" fill="hold" nodeType="clickEffect">
+                                  <p:stCondLst>
+                                    <p:cond delay="0"/>
+                                  </p:stCondLst>
+                                  <p:childTnLst>
+                                    <p:set>
+                                      <p:cBhvr>
+                                        <p:cTn id="14" dur="1" fill="hold">
+                                          <p:stCondLst>
+                                            <p:cond delay="0"/>
+                                          </p:stCondLst>
+                                        </p:cTn>
+                                        <p:tgtEl>
+                                          <p:spTgt spid="3">
+                                            <p:txEl>
+                                              <p:pRg st="2" end="2"/>
+                                            </p:txEl>
+                                          </p:spTgt>
+                                        </p:tgtEl>
+                                        <p:attrNameLst>
+                                          <p:attrName>style.visibility</p:attrName>
+                                        </p:attrNameLst>
+                                      </p:cBhvr>
+                                      <p:to>
+                                        <p:strVal val="visible"/>
+                                      </p:to>
+                                    </p:set>
+                                  </p:childTnLst>
+                                </p:cTn>
+                              </p:par>
+                            </p:childTnLst>
+                          </p:cTn>
+                        </p:par>
+                      </p:childTnLst>
+                    </p:cTn>
+                  </p:par>
+                  <p:par>
+                    <p:cTn id="15" fill="hold">
+                      <p:stCondLst>
+                        <p:cond delay="indefinite"/>
+                      </p:stCondLst>
+                      <p:childTnLst>
+                        <p:par>
+                          <p:cTn id="16" fill="hold">
+                            <p:stCondLst>
+                              <p:cond delay="0"/>
+                            </p:stCondLst>
+                            <p:childTnLst>
+                              <p:par>
+                                <p:cTn id="17" presetID="1" presetClass="entr" presetSubtype="0" fill="hold" nodeType="clickEffect">
+                                  <p:stCondLst>
+                                    <p:cond delay="0"/>
+                                  </p:stCondLst>
+                                  <p:childTnLst>
+                                    <p:set>
+                                      <p:cBhvr>
+                                        <p:cTn id="18" dur="1" fill="hold">
+                                          <p:stCondLst>
+                                            <p:cond delay="0"/>
+                                          </p:stCondLst>
+                                        </p:cTn>
+                                        <p:tgtEl>
+                                          <p:spTgt spid="3">
+                                            <p:txEl>
+                                              <p:pRg st="3" end="3"/>
+                                            </p:txEl>
+                                          </p:spTgt>
+                                        </p:tgtEl>
+                                        <p:attrNameLst>
+                                          <p:attrName>style.visibility</p:attrName>
+                                        </p:attrNameLst>
+                                      </p:cBhvr>
+                                      <p:to>
+                                        <p:strVal val="visible"/>
+                                      </p:to>
+                                    </p:set>
+                                  </p:childTnLst>
+                                </p:cTn>
+                              </p:par>
+                            </p:childTnLst>
+                          </p:cTn>
+                        </p:par>
+                      </p:childTnLst>
+                    </p:cTn>
+                  </p:par>
+                  <p:par>
+                    <p:cTn id="19" fill="hold">
+                      <p:stCondLst>
+                        <p:cond delay="indefinite"/>
+                      </p:stCondLst>
+                      <p:childTnLst>
+                        <p:par>
+                          <p:cTn id="20" fill="hold">
+                            <p:stCondLst>
+                              <p:cond delay="0"/>
+                            </p:stCondLst>
+                            <p:childTnLst>
+                              <p:par>
+                                <p:cTn id="21" presetID="1" presetClass="entr" presetSubtype="0" fill="hold" nodeType="clickEffect">
+                                  <p:stCondLst>
+                                    <p:cond delay="0"/>
+                                  </p:stCondLst>
+                                  <p:childTnLst>
+                                    <p:set>
+                                      <p:cBhvr>
+                                        <p:cTn id="22" dur="1" fill="hold">
+                                          <p:stCondLst>
+                                            <p:cond delay="0"/>
+                                          </p:stCondLst>
+                                        </p:cTn>
+                                        <p:tgtEl>
+                                          <p:spTgt spid="3">
+                                            <p:txEl>
+                                              <p:pRg st="4" end="4"/>
+                                            </p:txEl>
+                                          </p:spTgt>
+                                        </p:tgtEl>
+                                        <p:attrNameLst>
+                                          <p:attrName>style.visibility</p:attrName>
+                                        </p:attrNameLst>
+                                      </p:cBhvr>
+                                      <p:to>
+                                        <p:strVal val="visible"/>
+                                      </p:to>
+                                    </p:set>
+                                  </p:childTnLst>
+                                </p:cTn>
+                              </p:par>
+                            </p:childTnLst>
+                          </p:cTn>
+                        </p:par>
+                      </p:childTnLst>
+                    </p:cTn>
+                  </p:par>
+                  <p:par>
+                    <p:cTn id="23" fill="hold">
+                      <p:stCondLst>
+                        <p:cond delay="indefinite"/>
+                      </p:stCondLst>
+                      <p:childTnLst>
+                        <p:par>
+                          <p:cTn id="24" fill="hold">
+                            <p:stCondLst>
+                              <p:cond delay="0"/>
+                            </p:stCondLst>
+                            <p:childTnLst>
+                              <p:par>
+                                <p:cTn id="25" presetID="1" presetClass="entr" presetSubtype="0" fill="hold" nodeType="clickEffect">
+                                  <p:stCondLst>
+                                    <p:cond delay="0"/>
+                                  </p:stCondLst>
+                                  <p:childTnLst>
+                                    <p:set>
+                                      <p:cBhvr>
+                                        <p:cTn id="26" dur="1" fill="hold">
+                                          <p:stCondLst>
+                                            <p:cond delay="0"/>
+                                          </p:stCondLst>
+                                        </p:cTn>
+                                        <p:tgtEl>
+                                          <p:spTgt spid="3">
+                                            <p:txEl>
+                                              <p:pRg st="5" end="5"/>
+                                            </p:txEl>
+                                          </p:spTgt>
+                                        </p:tgtEl>
+                                        <p:attrNameLst>
+                                          <p:attrName>style.visibility</p:attrName>
+                                        </p:attrNameLst>
+                                      </p:cBhvr>
+                                      <p:to>
+                                        <p:strVal val="visible"/>
+                                      </p:to>
+                                    </p:set>
+                                  </p:childTnLst>
+                                </p:cTn>
+                              </p:par>
+                            </p:childTnLst>
+                          </p:cTn>
+                        </p:par>
+                      </p:childTnLst>
+                    </p:cTn>
+                  </p:par>
+                </p:childTnLst>
+              </p:cTn>
+              <p:prevCondLst>
+                <p:cond evt="onPrev" delay="0">
+                  <p:tgtEl>
+                    <p:sldTgt/>
+                  </p:tgtEl>
+                </p:cond>
+              </p:prevCondLst>
+              <p:nextCondLst>
+                <p:cond evt="onNext" delay="0">
+                  <p:tgtEl>
+                    <p:sldTgt/>
+                  </p:tgtEl>
+                </p:cond>
+              </p:nextCondLst>
+            </p:seq>
+          </p:childTnLst>
+        </p:cTn>
+      </p:par>
+    </p:tnLst>
+  </p:timing>
+</p:sld>
+</file>
+
+<file path=ppt/slides/slide17.xml><?xml version="1.0" encoding="utf-8"?>
+<p:sld xmlns:a="http://schemas.openxmlformats.org/drawingml/2006/main" xmlns:r="http://schemas.openxmlformats.org/officeDocument/2006/relationships" xmlns:p="http://schemas.openxmlformats.org/presentationml/2006/main">
+  <p:cSld>
+    <p:spTree>
+      <p:nvGrpSpPr>
+        <p:cNvPr id="1" name=""/>
+        <p:cNvGrpSpPr/>
+        <p:nvPr/>
+      </p:nvGrpSpPr>
+      <p:grpSpPr>
+        <a:xfrm>
+          <a:off x="0" y="0"/>
+          <a:ext cx="0" cy="0"/>
+          <a:chOff x="0" y="0"/>
+          <a:chExt cx="0" cy="0"/>
+        </a:xfrm>
+      </p:grpSpPr>
+      <p:sp>
+        <p:nvSpPr>
+          <p:cNvPr id="2" name="Titre 1">
+            <a:extLst>
+              <a:ext uri="{FF2B5EF4-FFF2-40B4-BE49-F238E27FC236}">
+                <a16:creationId xmlns:a16="http://schemas.microsoft.com/office/drawing/2014/main" id="{C76417E9-046A-3EDD-D071-BC7D983CDA12}"/>
+              </a:ext>
+            </a:extLst>
+          </p:cNvPr>
+          <p:cNvSpPr>
+            <a:spLocks noGrp="1"/>
+          </p:cNvSpPr>
+          <p:nvPr>
+            <p:ph type="title"/>
+          </p:nvPr>
+        </p:nvSpPr>
+        <p:spPr>
+          <a:xfrm>
+            <a:off x="1088136" y="725120"/>
+            <a:ext cx="9922764" cy="1294228"/>
+          </a:xfrm>
+        </p:spPr>
+        <p:txBody>
+          <a:bodyPr/>
+          <a:lstStyle/>
+          <a:p>
+            <a:r>
+              <a:rPr kumimoji="0" lang="fr-FR" sz="5000" b="1" i="0" u="none" strike="noStrike" kern="1200" cap="none" spc="0" normalizeH="0" baseline="0" noProof="0" dirty="0">
+                <a:ln>
+                  <a:noFill/>
+                </a:ln>
+                <a:solidFill>
+                  <a:prstClr val="black"/>
+                </a:solidFill>
+                <a:effectLst/>
+                <a:uLnTx/>
+                <a:uFillTx/>
+                <a:latin typeface="Neue Haas Grotesk Text Pro"/>
+                <a:ea typeface="+mj-ea"/>
+                <a:cs typeface="+mj-cs"/>
+              </a:rPr>
+              <a:t>SIGHUP (3/5)</a:t>
+            </a:r>
+            <a:endParaRPr lang="fr-BE" dirty="0"/>
+          </a:p>
+        </p:txBody>
+      </p:sp>
+      <p:pic>
+        <p:nvPicPr>
+          <p:cNvPr id="8" name="Espace réservé du contenu 7">
+            <a:extLst>
+              <a:ext uri="{FF2B5EF4-FFF2-40B4-BE49-F238E27FC236}">
+                <a16:creationId xmlns:a16="http://schemas.microsoft.com/office/drawing/2014/main" id="{21552C6C-D229-6BEE-2B47-3F9587634DD0}"/>
+              </a:ext>
+            </a:extLst>
+          </p:cNvPr>
+          <p:cNvPicPr>
+            <a:picLocks noGrp="1" noChangeAspect="1"/>
+          </p:cNvPicPr>
+          <p:nvPr>
+            <p:ph idx="1"/>
+          </p:nvPr>
+        </p:nvPicPr>
+        <p:blipFill>
+          <a:blip r:embed="rId2"/>
+          <a:stretch>
+            <a:fillRect/>
+          </a:stretch>
+        </p:blipFill>
+        <p:spPr>
+          <a:xfrm>
+            <a:off x="1088136" y="1338678"/>
+            <a:ext cx="9054154" cy="4955010"/>
+          </a:xfrm>
+        </p:spPr>
+      </p:pic>
+      <p:sp>
+        <p:nvSpPr>
+          <p:cNvPr id="4" name="Espace réservé de la date 3">
+            <a:extLst>
+              <a:ext uri="{FF2B5EF4-FFF2-40B4-BE49-F238E27FC236}">
+                <a16:creationId xmlns:a16="http://schemas.microsoft.com/office/drawing/2014/main" id="{A3060A28-3498-8148-A882-0031042C52F1}"/>
+              </a:ext>
+            </a:extLst>
+          </p:cNvPr>
+          <p:cNvSpPr>
+            <a:spLocks noGrp="1"/>
+          </p:cNvSpPr>
+          <p:nvPr>
+            <p:ph type="dt" sz="half" idx="10"/>
+          </p:nvPr>
+        </p:nvSpPr>
+        <p:spPr/>
+        <p:txBody>
+          <a:bodyPr/>
+          <a:lstStyle/>
+          <a:p>
+            <a:fld id="{37AD5F8E-F96A-4AFD-A571-9DF5FE5D3317}" type="datetime1">
+              <a:rPr lang="fr-BE" smtClean="0"/>
+              <a:t>06-12-23</a:t>
+            </a:fld>
+            <a:endParaRPr lang="en-US"/>
+          </a:p>
+        </p:txBody>
+      </p:sp>
+      <p:sp>
+        <p:nvSpPr>
+          <p:cNvPr id="5" name="Espace réservé du pied de page 4">
+            <a:extLst>
+              <a:ext uri="{FF2B5EF4-FFF2-40B4-BE49-F238E27FC236}">
+                <a16:creationId xmlns:a16="http://schemas.microsoft.com/office/drawing/2014/main" id="{A1586D41-C308-88E1-5F40-0AB724571A70}"/>
+              </a:ext>
+            </a:extLst>
+          </p:cNvPr>
+          <p:cNvSpPr>
+            <a:spLocks noGrp="1"/>
+          </p:cNvSpPr>
+          <p:nvPr>
+            <p:ph type="ftr" sz="quarter" idx="11"/>
+          </p:nvPr>
+        </p:nvSpPr>
+        <p:spPr/>
+        <p:txBody>
+          <a:bodyPr/>
+          <a:lstStyle/>
+          <a:p>
+            <a:r>
+              <a:rPr lang="en-US"/>
+              <a:t>58093@etu.he2b.be</a:t>
+            </a:r>
+          </a:p>
+        </p:txBody>
+      </p:sp>
+      <p:sp>
+        <p:nvSpPr>
+          <p:cNvPr id="6" name="Espace réservé du numéro de diapositive 5">
+            <a:extLst>
+              <a:ext uri="{FF2B5EF4-FFF2-40B4-BE49-F238E27FC236}">
+                <a16:creationId xmlns:a16="http://schemas.microsoft.com/office/drawing/2014/main" id="{9A9C59C7-762B-E343-E3E6-58837B481426}"/>
+              </a:ext>
+            </a:extLst>
+          </p:cNvPr>
+          <p:cNvSpPr>
+            <a:spLocks noGrp="1"/>
+          </p:cNvSpPr>
+          <p:nvPr>
+            <p:ph type="sldNum" sz="quarter" idx="12"/>
+          </p:nvPr>
+        </p:nvSpPr>
+        <p:spPr/>
+        <p:txBody>
+          <a:bodyPr/>
+          <a:lstStyle/>
+          <a:p>
+            <a:fld id="{719D7796-F675-488F-AC46-C88938C80352}" type="slidenum">
+              <a:rPr lang="en-US" smtClean="0"/>
+              <a:t>17</a:t>
+            </a:fld>
+            <a:endParaRPr lang="en-US"/>
+          </a:p>
+        </p:txBody>
+      </p:sp>
+    </p:spTree>
+    <p:extLst>
+      <p:ext uri="{BB962C8B-B14F-4D97-AF65-F5344CB8AC3E}">
+        <p14:creationId xmlns:p14="http://schemas.microsoft.com/office/powerpoint/2010/main" val="2593893360"/>
+      </p:ext>
+    </p:extLst>
+  </p:cSld>
+  <p:clrMapOvr>
+    <a:masterClrMapping/>
+  </p:clrMapOvr>
+</p:sld>
+</file>
+
+<file path=ppt/slides/slide18.xml><?xml version="1.0" encoding="utf-8"?>
+<p:sld xmlns:a="http://schemas.openxmlformats.org/drawingml/2006/main" xmlns:r="http://schemas.openxmlformats.org/officeDocument/2006/relationships" xmlns:p="http://schemas.openxmlformats.org/presentationml/2006/main">
+  <p:cSld>
+    <p:spTree>
+      <p:nvGrpSpPr>
+        <p:cNvPr id="1" name=""/>
+        <p:cNvGrpSpPr/>
+        <p:nvPr/>
+      </p:nvGrpSpPr>
+      <p:grpSpPr>
+        <a:xfrm>
+          <a:off x="0" y="0"/>
+          <a:ext cx="0" cy="0"/>
+          <a:chOff x="0" y="0"/>
+          <a:chExt cx="0" cy="0"/>
+        </a:xfrm>
+      </p:grpSpPr>
+      <p:sp>
+        <p:nvSpPr>
+          <p:cNvPr id="2" name="Titre 1">
+            <a:extLst>
+              <a:ext uri="{FF2B5EF4-FFF2-40B4-BE49-F238E27FC236}">
+                <a16:creationId xmlns:a16="http://schemas.microsoft.com/office/drawing/2014/main" id="{EA7F0EB5-32E8-4182-1B52-A41D6522FE78}"/>
+              </a:ext>
+            </a:extLst>
+          </p:cNvPr>
+          <p:cNvSpPr>
+            <a:spLocks noGrp="1"/>
+          </p:cNvSpPr>
+          <p:nvPr>
+            <p:ph type="title"/>
+          </p:nvPr>
+        </p:nvSpPr>
+        <p:spPr/>
+        <p:txBody>
+          <a:bodyPr/>
+          <a:lstStyle/>
+          <a:p>
+            <a:r>
+              <a:rPr kumimoji="0" lang="fr-FR" sz="5000" b="1" i="0" u="none" strike="noStrike" kern="1200" cap="none" spc="0" normalizeH="0" baseline="0" noProof="0" dirty="0">
+                <a:ln>
+                  <a:noFill/>
+                </a:ln>
+                <a:solidFill>
+                  <a:prstClr val="black"/>
+                </a:solidFill>
+                <a:effectLst/>
+                <a:uLnTx/>
+                <a:uFillTx/>
+                <a:latin typeface="Neue Haas Grotesk Text Pro"/>
+                <a:ea typeface="+mj-ea"/>
+                <a:cs typeface="+mj-cs"/>
+              </a:rPr>
+              <a:t>SIGHUP (4/5)</a:t>
+            </a:r>
+            <a:endParaRPr lang="fr-BE" dirty="0"/>
+          </a:p>
+        </p:txBody>
+      </p:sp>
+      <p:sp>
+        <p:nvSpPr>
+          <p:cNvPr id="3" name="Espace réservé du contenu 2">
+            <a:extLst>
+              <a:ext uri="{FF2B5EF4-FFF2-40B4-BE49-F238E27FC236}">
+                <a16:creationId xmlns:a16="http://schemas.microsoft.com/office/drawing/2014/main" id="{3B0ECED4-A1AB-67F7-58CC-43F6DEC56839}"/>
+              </a:ext>
+            </a:extLst>
+          </p:cNvPr>
+          <p:cNvSpPr>
+            <a:spLocks noGrp="1"/>
+          </p:cNvSpPr>
+          <p:nvPr>
+            <p:ph idx="1"/>
+          </p:nvPr>
+        </p:nvSpPr>
+        <p:spPr>
+          <a:xfrm>
+            <a:off x="1088136" y="2447778"/>
+            <a:ext cx="3936870" cy="3838722"/>
+          </a:xfrm>
+        </p:spPr>
+        <p:txBody>
+          <a:bodyPr>
+            <a:normAutofit/>
+          </a:bodyPr>
+          <a:lstStyle/>
+          <a:p>
+            <a:r>
+              <a:rPr lang="fr-BE" sz="2500" i="1" dirty="0" err="1"/>
+              <a:t>nohup</a:t>
+            </a:r>
+            <a:endParaRPr lang="fr-BE" sz="2500" i="1" dirty="0"/>
+          </a:p>
+          <a:p>
+            <a:pPr lvl="1"/>
+            <a:r>
+              <a:rPr lang="fr-BE" sz="2500" dirty="0"/>
+              <a:t>Ignorer SIGHUP</a:t>
+            </a:r>
+          </a:p>
+          <a:p>
+            <a:pPr lvl="1"/>
+            <a:r>
+              <a:rPr lang="fr-BE" sz="2500" i="1" dirty="0" err="1"/>
+              <a:t>stdout</a:t>
+            </a:r>
+            <a:r>
+              <a:rPr lang="fr-BE" sz="2500" dirty="0"/>
+              <a:t> =&gt;  </a:t>
+            </a:r>
+            <a:r>
+              <a:rPr lang="fr-BE" sz="2500" i="1" dirty="0" err="1"/>
+              <a:t>nohup.out</a:t>
+            </a:r>
+            <a:endParaRPr lang="fr-BE" sz="2500" i="1" dirty="0"/>
+          </a:p>
+          <a:p>
+            <a:pPr lvl="1"/>
+            <a:r>
+              <a:rPr lang="fr-BE" sz="2500" u="sng" dirty="0"/>
+              <a:t>Démonstration</a:t>
+            </a:r>
+          </a:p>
+          <a:p>
+            <a:pPr lvl="1"/>
+            <a:endParaRPr lang="fr-BE" sz="2500" i="1" dirty="0"/>
+          </a:p>
+        </p:txBody>
+      </p:sp>
+      <p:sp>
+        <p:nvSpPr>
+          <p:cNvPr id="4" name="Espace réservé de la date 3">
+            <a:extLst>
+              <a:ext uri="{FF2B5EF4-FFF2-40B4-BE49-F238E27FC236}">
+                <a16:creationId xmlns:a16="http://schemas.microsoft.com/office/drawing/2014/main" id="{16B2FFD2-DE30-D0E4-4351-A9278FA7F9B3}"/>
+              </a:ext>
+            </a:extLst>
+          </p:cNvPr>
+          <p:cNvSpPr>
+            <a:spLocks noGrp="1"/>
+          </p:cNvSpPr>
+          <p:nvPr>
+            <p:ph type="dt" sz="half" idx="10"/>
+          </p:nvPr>
+        </p:nvSpPr>
+        <p:spPr/>
+        <p:txBody>
+          <a:bodyPr/>
+          <a:lstStyle/>
+          <a:p>
+            <a:fld id="{37AD5F8E-F96A-4AFD-A571-9DF5FE5D3317}" type="datetime1">
+              <a:rPr lang="fr-BE" smtClean="0"/>
+              <a:t>06-12-23</a:t>
+            </a:fld>
+            <a:endParaRPr lang="en-US"/>
+          </a:p>
+        </p:txBody>
+      </p:sp>
+      <p:sp>
+        <p:nvSpPr>
+          <p:cNvPr id="5" name="Espace réservé du pied de page 4">
+            <a:extLst>
+              <a:ext uri="{FF2B5EF4-FFF2-40B4-BE49-F238E27FC236}">
+                <a16:creationId xmlns:a16="http://schemas.microsoft.com/office/drawing/2014/main" id="{811E3035-F34E-091C-0B92-8CAD14A91DCF}"/>
+              </a:ext>
+            </a:extLst>
+          </p:cNvPr>
+          <p:cNvSpPr>
+            <a:spLocks noGrp="1"/>
+          </p:cNvSpPr>
+          <p:nvPr>
+            <p:ph type="ftr" sz="quarter" idx="11"/>
+          </p:nvPr>
+        </p:nvSpPr>
+        <p:spPr/>
+        <p:txBody>
+          <a:bodyPr/>
+          <a:lstStyle/>
+          <a:p>
+            <a:r>
+              <a:rPr lang="en-US"/>
+              <a:t>58093@etu.he2b.be</a:t>
+            </a:r>
+          </a:p>
+        </p:txBody>
+      </p:sp>
+      <p:sp>
+        <p:nvSpPr>
+          <p:cNvPr id="6" name="Espace réservé du numéro de diapositive 5">
+            <a:extLst>
+              <a:ext uri="{FF2B5EF4-FFF2-40B4-BE49-F238E27FC236}">
+                <a16:creationId xmlns:a16="http://schemas.microsoft.com/office/drawing/2014/main" id="{EE055251-9B02-571E-0695-0B52E400DADC}"/>
+              </a:ext>
+            </a:extLst>
+          </p:cNvPr>
+          <p:cNvSpPr>
+            <a:spLocks noGrp="1"/>
+          </p:cNvSpPr>
+          <p:nvPr>
+            <p:ph type="sldNum" sz="quarter" idx="12"/>
+          </p:nvPr>
+        </p:nvSpPr>
+        <p:spPr/>
+        <p:txBody>
+          <a:bodyPr/>
+          <a:lstStyle/>
+          <a:p>
+            <a:fld id="{719D7796-F675-488F-AC46-C88938C80352}" type="slidenum">
+              <a:rPr lang="en-US" smtClean="0"/>
+              <a:t>18</a:t>
+            </a:fld>
+            <a:endParaRPr lang="en-US"/>
+          </a:p>
+        </p:txBody>
+      </p:sp>
+    </p:spTree>
+    <p:extLst>
+      <p:ext uri="{BB962C8B-B14F-4D97-AF65-F5344CB8AC3E}">
+        <p14:creationId xmlns:p14="http://schemas.microsoft.com/office/powerpoint/2010/main" val="2363160137"/>
+      </p:ext>
+    </p:extLst>
+  </p:cSld>
+  <p:clrMapOvr>
+    <a:masterClrMapping/>
+  </p:clrMapOvr>
+  <p:timing>
+    <p:tnLst>
+      <p:par>
+        <p:cTn id="1" dur="indefinite" restart="never" nodeType="tmRoot">
+          <p:childTnLst>
+            <p:seq concurrent="1" nextAc="seek">
+              <p:cTn id="2" dur="indefinite" nodeType="mainSeq">
+                <p:childTnLst>
+                  <p:par>
+                    <p:cTn id="3" fill="hold">
+                      <p:stCondLst>
+                        <p:cond delay="indefinite"/>
+                      </p:stCondLst>
+                      <p:childTnLst>
+                        <p:par>
+                          <p:cTn id="4" fill="hold">
+                            <p:stCondLst>
+                              <p:cond delay="0"/>
+                            </p:stCondLst>
+                            <p:childTnLst>
+                              <p:par>
+                                <p:cTn id="5" presetID="1" presetClass="entr" presetSubtype="0" fill="hold" nodeType="clickEffect">
+                                  <p:stCondLst>
+                                    <p:cond delay="0"/>
+                                  </p:stCondLst>
+                                  <p:childTnLst>
+                                    <p:set>
+                                      <p:cBhvr>
+                                        <p:cTn id="6" dur="1" fill="hold">
+                                          <p:stCondLst>
+                                            <p:cond delay="0"/>
+                                          </p:stCondLst>
+                                        </p:cTn>
+                                        <p:tgtEl>
+                                          <p:spTgt spid="3">
+                                            <p:txEl>
+                                              <p:pRg st="0" end="0"/>
+                                            </p:txEl>
+                                          </p:spTgt>
+                                        </p:tgtEl>
+                                        <p:attrNameLst>
+                                          <p:attrName>style.visibility</p:attrName>
+                                        </p:attrNameLst>
+                                      </p:cBhvr>
+                                      <p:to>
+                                        <p:strVal val="visible"/>
+                                      </p:to>
+                                    </p:set>
+                                  </p:childTnLst>
+                                </p:cTn>
+                              </p:par>
+                            </p:childTnLst>
+                          </p:cTn>
+                        </p:par>
+                      </p:childTnLst>
+                    </p:cTn>
+                  </p:par>
+                  <p:par>
+                    <p:cTn id="7" fill="hold">
+                      <p:stCondLst>
+                        <p:cond delay="indefinite"/>
+                      </p:stCondLst>
+                      <p:childTnLst>
+                        <p:par>
+                          <p:cTn id="8" fill="hold">
+                            <p:stCondLst>
+                              <p:cond delay="0"/>
+                            </p:stCondLst>
+                            <p:childTnLst>
+                              <p:par>
+                                <p:cTn id="9" presetID="1" presetClass="entr" presetSubtype="0" fill="hold" nodeType="clickEffect">
+                                  <p:stCondLst>
+                                    <p:cond delay="0"/>
+                                  </p:stCondLst>
+                                  <p:childTnLst>
+                                    <p:set>
+                                      <p:cBhvr>
+                                        <p:cTn id="10" dur="1" fill="hold">
+                                          <p:stCondLst>
+                                            <p:cond delay="0"/>
+                                          </p:stCondLst>
+                                        </p:cTn>
+                                        <p:tgtEl>
+                                          <p:spTgt spid="3">
+                                            <p:txEl>
+                                              <p:pRg st="1" end="1"/>
+                                            </p:txEl>
+                                          </p:spTgt>
+                                        </p:tgtEl>
+                                        <p:attrNameLst>
+                                          <p:attrName>style.visibility</p:attrName>
+                                        </p:attrNameLst>
+                                      </p:cBhvr>
+                                      <p:to>
+                                        <p:strVal val="visible"/>
+                                      </p:to>
+                                    </p:set>
+                                  </p:childTnLst>
+                                </p:cTn>
+                              </p:par>
+                            </p:childTnLst>
+                          </p:cTn>
+                        </p:par>
+                      </p:childTnLst>
+                    </p:cTn>
+                  </p:par>
+                  <p:par>
+                    <p:cTn id="11" fill="hold">
+                      <p:stCondLst>
+                        <p:cond delay="indefinite"/>
+                      </p:stCondLst>
+                      <p:childTnLst>
+                        <p:par>
+                          <p:cTn id="12" fill="hold">
+                            <p:stCondLst>
+                              <p:cond delay="0"/>
+                            </p:stCondLst>
+                            <p:childTnLst>
+                              <p:par>
+                                <p:cTn id="13" presetID="1" presetClass="entr" presetSubtype="0" fill="hold" nodeType="clickEffect">
+                                  <p:stCondLst>
+                                    <p:cond delay="0"/>
+                                  </p:stCondLst>
+                                  <p:childTnLst>
+                                    <p:set>
+                                      <p:cBhvr>
+                                        <p:cTn id="14" dur="1" fill="hold">
+                                          <p:stCondLst>
+                                            <p:cond delay="0"/>
+                                          </p:stCondLst>
+                                        </p:cTn>
+                                        <p:tgtEl>
+                                          <p:spTgt spid="3">
+                                            <p:txEl>
+                                              <p:pRg st="2" end="2"/>
+                                            </p:txEl>
+                                          </p:spTgt>
+                                        </p:tgtEl>
+                                        <p:attrNameLst>
+                                          <p:attrName>style.visibility</p:attrName>
+                                        </p:attrNameLst>
+                                      </p:cBhvr>
+                                      <p:to>
+                                        <p:strVal val="visible"/>
+                                      </p:to>
+                                    </p:set>
+                                  </p:childTnLst>
+                                </p:cTn>
+                              </p:par>
+                            </p:childTnLst>
+                          </p:cTn>
+                        </p:par>
+                      </p:childTnLst>
+                    </p:cTn>
+                  </p:par>
+                  <p:par>
+                    <p:cTn id="15" fill="hold">
+                      <p:stCondLst>
+                        <p:cond delay="indefinite"/>
+                      </p:stCondLst>
+                      <p:childTnLst>
+                        <p:par>
+                          <p:cTn id="16" fill="hold">
+                            <p:stCondLst>
+                              <p:cond delay="0"/>
+                            </p:stCondLst>
+                            <p:childTnLst>
+                              <p:par>
+                                <p:cTn id="17" presetID="1" presetClass="entr" presetSubtype="0" fill="hold" nodeType="clickEffect">
+                                  <p:stCondLst>
+                                    <p:cond delay="0"/>
+                                  </p:stCondLst>
+                                  <p:childTnLst>
+                                    <p:set>
+                                      <p:cBhvr>
+                                        <p:cTn id="18" dur="1" fill="hold">
+                                          <p:stCondLst>
+                                            <p:cond delay="0"/>
+                                          </p:stCondLst>
+                                        </p:cTn>
+                                        <p:tgtEl>
+                                          <p:spTgt spid="3">
+                                            <p:txEl>
+                                              <p:pRg st="3" end="3"/>
+                                            </p:txEl>
+                                          </p:spTgt>
+                                        </p:tgtEl>
+                                        <p:attrNameLst>
+                                          <p:attrName>style.visibility</p:attrName>
+                                        </p:attrNameLst>
+                                      </p:cBhvr>
+                                      <p:to>
+                                        <p:strVal val="visible"/>
+                                      </p:to>
+                                    </p:set>
+                                  </p:childTnLst>
+                                </p:cTn>
+                              </p:par>
+                            </p:childTnLst>
+                          </p:cTn>
+                        </p:par>
+                      </p:childTnLst>
+                    </p:cTn>
+                  </p:par>
+                </p:childTnLst>
+              </p:cTn>
+              <p:prevCondLst>
+                <p:cond evt="onPrev" delay="0">
+                  <p:tgtEl>
+                    <p:sldTgt/>
+                  </p:tgtEl>
+                </p:cond>
+              </p:prevCondLst>
+              <p:nextCondLst>
+                <p:cond evt="onNext" delay="0">
+                  <p:tgtEl>
+                    <p:sldTgt/>
+                  </p:tgtEl>
+                </p:cond>
+              </p:nextCondLst>
+            </p:seq>
+          </p:childTnLst>
+        </p:cTn>
+      </p:par>
+    </p:tnLst>
+  </p:timing>
+</p:sld>
+</file>
+
+<file path=ppt/slides/slide19.xml><?xml version="1.0" encoding="utf-8"?>
+<p:sld xmlns:a="http://schemas.openxmlformats.org/drawingml/2006/main" xmlns:r="http://schemas.openxmlformats.org/officeDocument/2006/relationships" xmlns:p="http://schemas.openxmlformats.org/presentationml/2006/main">
+  <p:cSld>
+    <p:spTree>
+      <p:nvGrpSpPr>
+        <p:cNvPr id="1" name=""/>
+        <p:cNvGrpSpPr/>
+        <p:nvPr/>
+      </p:nvGrpSpPr>
+      <p:grpSpPr>
+        <a:xfrm>
+          <a:off x="0" y="0"/>
+          <a:ext cx="0" cy="0"/>
+          <a:chOff x="0" y="0"/>
+          <a:chExt cx="0" cy="0"/>
+        </a:xfrm>
+      </p:grpSpPr>
+      <p:sp>
+        <p:nvSpPr>
+          <p:cNvPr id="2" name="Titre 1">
+            <a:extLst>
+              <a:ext uri="{FF2B5EF4-FFF2-40B4-BE49-F238E27FC236}">
+                <a16:creationId xmlns:a16="http://schemas.microsoft.com/office/drawing/2014/main" id="{78CF51CE-30F2-676E-FD26-5B5280BE304C}"/>
+              </a:ext>
+            </a:extLst>
+          </p:cNvPr>
+          <p:cNvSpPr>
+            <a:spLocks noGrp="1"/>
+          </p:cNvSpPr>
+          <p:nvPr>
+            <p:ph type="title"/>
+          </p:nvPr>
+        </p:nvSpPr>
+        <p:spPr/>
+        <p:txBody>
+          <a:bodyPr/>
+          <a:lstStyle/>
+          <a:p>
+            <a:r>
+              <a:rPr kumimoji="0" lang="fr-FR" sz="5000" b="1" i="0" u="none" strike="noStrike" kern="1200" cap="none" spc="0" normalizeH="0" baseline="0" noProof="0" dirty="0">
+                <a:ln>
+                  <a:noFill/>
+                </a:ln>
+                <a:solidFill>
+                  <a:prstClr val="black"/>
+                </a:solidFill>
+                <a:effectLst/>
+                <a:uLnTx/>
+                <a:uFillTx/>
+                <a:latin typeface="Neue Haas Grotesk Text Pro"/>
+                <a:ea typeface="+mj-ea"/>
+                <a:cs typeface="+mj-cs"/>
+              </a:rPr>
+              <a:t>SIGHUP (5/5)</a:t>
+            </a:r>
+            <a:endParaRPr lang="fr-BE" dirty="0"/>
+          </a:p>
+        </p:txBody>
+      </p:sp>
+      <p:sp>
+        <p:nvSpPr>
+          <p:cNvPr id="3" name="Espace réservé du contenu 2">
+            <a:extLst>
+              <a:ext uri="{FF2B5EF4-FFF2-40B4-BE49-F238E27FC236}">
+                <a16:creationId xmlns:a16="http://schemas.microsoft.com/office/drawing/2014/main" id="{5A779833-73C6-E2EA-513A-5006C509B559}"/>
+              </a:ext>
+            </a:extLst>
+          </p:cNvPr>
+          <p:cNvSpPr>
+            <a:spLocks noGrp="1"/>
+          </p:cNvSpPr>
+          <p:nvPr>
+            <p:ph idx="1"/>
+          </p:nvPr>
+        </p:nvSpPr>
+        <p:spPr/>
+        <p:txBody>
+          <a:bodyPr/>
+          <a:lstStyle/>
+          <a:p>
+            <a:r>
+              <a:rPr lang="fr-FR" sz="2500" i="1" dirty="0" err="1"/>
+              <a:t>disown</a:t>
+            </a:r>
+            <a:endParaRPr lang="fr-BE" sz="2500" i="1" dirty="0"/>
+          </a:p>
+          <a:p>
+            <a:pPr lvl="1"/>
+            <a:r>
+              <a:rPr lang="fr-FR" sz="2500" dirty="0"/>
+              <a:t>Ignorer SIGHUP</a:t>
+            </a:r>
+          </a:p>
+          <a:p>
+            <a:pPr lvl="1"/>
+            <a:r>
+              <a:rPr lang="fr-FR" sz="2500" dirty="0"/>
+              <a:t>Retirer de la liste des jobs</a:t>
+            </a:r>
+          </a:p>
+          <a:p>
+            <a:pPr marL="502920" marR="0" lvl="1" indent="-228600" algn="l" defTabSz="914400" rtl="0" eaLnBrk="1" fontAlgn="auto" latinLnBrk="0" hangingPunct="1">
+              <a:lnSpc>
+                <a:spcPct val="130000"/>
+              </a:lnSpc>
+              <a:spcBef>
+                <a:spcPts val="500"/>
+              </a:spcBef>
+              <a:spcAft>
+                <a:spcPts val="0"/>
+              </a:spcAft>
+              <a:buClrTx/>
+              <a:buSzTx/>
+              <a:buFont typeface="Neue Haas Grotesk Text Pro" panose="020B0504020202020204" pitchFamily="34" charset="0"/>
+              <a:buChar char="-"/>
+              <a:tabLst/>
+              <a:defRPr/>
+            </a:pPr>
+            <a:r>
+              <a:rPr kumimoji="0" lang="fr-BE" sz="2500" b="0" i="0" u="sng" strike="noStrike" kern="1200" cap="none" spc="0" normalizeH="0" baseline="0" noProof="0" dirty="0">
+                <a:ln>
+                  <a:noFill/>
+                </a:ln>
+                <a:solidFill>
+                  <a:prstClr val="black"/>
+                </a:solidFill>
+                <a:effectLst/>
+                <a:uLnTx/>
+                <a:uFillTx/>
+                <a:latin typeface="Neue Haas Grotesk Text Pro"/>
+                <a:ea typeface="+mn-ea"/>
+                <a:cs typeface="+mn-cs"/>
+              </a:rPr>
+              <a:t>Démonstration</a:t>
+            </a:r>
+          </a:p>
+          <a:p>
+            <a:pPr lvl="1"/>
+            <a:endParaRPr lang="fr-FR" sz="2500" dirty="0"/>
+          </a:p>
+        </p:txBody>
+      </p:sp>
+      <p:sp>
+        <p:nvSpPr>
+          <p:cNvPr id="4" name="Espace réservé de la date 3">
+            <a:extLst>
+              <a:ext uri="{FF2B5EF4-FFF2-40B4-BE49-F238E27FC236}">
+                <a16:creationId xmlns:a16="http://schemas.microsoft.com/office/drawing/2014/main" id="{8A697FDB-DE10-CD25-5937-8856E6EB7CB9}"/>
+              </a:ext>
+            </a:extLst>
+          </p:cNvPr>
+          <p:cNvSpPr>
+            <a:spLocks noGrp="1"/>
+          </p:cNvSpPr>
+          <p:nvPr>
+            <p:ph type="dt" sz="half" idx="10"/>
+          </p:nvPr>
+        </p:nvSpPr>
+        <p:spPr/>
+        <p:txBody>
+          <a:bodyPr/>
+          <a:lstStyle/>
+          <a:p>
+            <a:fld id="{37AD5F8E-F96A-4AFD-A571-9DF5FE5D3317}" type="datetime1">
+              <a:rPr lang="fr-BE" smtClean="0"/>
+              <a:t>06-12-23</a:t>
+            </a:fld>
+            <a:endParaRPr lang="en-US"/>
+          </a:p>
+        </p:txBody>
+      </p:sp>
+      <p:sp>
+        <p:nvSpPr>
+          <p:cNvPr id="5" name="Espace réservé du pied de page 4">
+            <a:extLst>
+              <a:ext uri="{FF2B5EF4-FFF2-40B4-BE49-F238E27FC236}">
+                <a16:creationId xmlns:a16="http://schemas.microsoft.com/office/drawing/2014/main" id="{E165B492-197A-AAE4-62A2-DD7ACD97179C}"/>
+              </a:ext>
+            </a:extLst>
+          </p:cNvPr>
+          <p:cNvSpPr>
+            <a:spLocks noGrp="1"/>
+          </p:cNvSpPr>
+          <p:nvPr>
+            <p:ph type="ftr" sz="quarter" idx="11"/>
+          </p:nvPr>
+        </p:nvSpPr>
+        <p:spPr/>
+        <p:txBody>
+          <a:bodyPr/>
+          <a:lstStyle/>
+          <a:p>
+            <a:r>
+              <a:rPr lang="en-US"/>
+              <a:t>58093@etu.he2b.be</a:t>
+            </a:r>
+          </a:p>
+        </p:txBody>
+      </p:sp>
+      <p:sp>
+        <p:nvSpPr>
+          <p:cNvPr id="6" name="Espace réservé du numéro de diapositive 5">
+            <a:extLst>
+              <a:ext uri="{FF2B5EF4-FFF2-40B4-BE49-F238E27FC236}">
+                <a16:creationId xmlns:a16="http://schemas.microsoft.com/office/drawing/2014/main" id="{96BE8B7D-CE61-A051-479C-6596FBECEFE7}"/>
+              </a:ext>
+            </a:extLst>
+          </p:cNvPr>
+          <p:cNvSpPr>
+            <a:spLocks noGrp="1"/>
+          </p:cNvSpPr>
+          <p:nvPr>
+            <p:ph type="sldNum" sz="quarter" idx="12"/>
+          </p:nvPr>
+        </p:nvSpPr>
+        <p:spPr/>
+        <p:txBody>
+          <a:bodyPr/>
+          <a:lstStyle/>
+          <a:p>
+            <a:fld id="{719D7796-F675-488F-AC46-C88938C80352}" type="slidenum">
+              <a:rPr lang="en-US" smtClean="0"/>
+              <a:t>19</a:t>
+            </a:fld>
+            <a:endParaRPr lang="en-US"/>
+          </a:p>
+        </p:txBody>
+      </p:sp>
+    </p:spTree>
+    <p:extLst>
+      <p:ext uri="{BB962C8B-B14F-4D97-AF65-F5344CB8AC3E}">
+        <p14:creationId xmlns:p14="http://schemas.microsoft.com/office/powerpoint/2010/main" val="1658797944"/>
+      </p:ext>
+    </p:extLst>
+  </p:cSld>
+  <p:clrMapOvr>
+    <a:masterClrMapping/>
+  </p:clrMapOvr>
+  <p:timing>
+    <p:tnLst>
+      <p:par>
+        <p:cTn id="1" dur="indefinite" restart="never" nodeType="tmRoot">
+          <p:childTnLst>
+            <p:seq concurrent="1" nextAc="seek">
+              <p:cTn id="2" dur="indefinite" nodeType="mainSeq">
+                <p:childTnLst>
+                  <p:par>
+                    <p:cTn id="3" fill="hold">
+                      <p:stCondLst>
+                        <p:cond delay="indefinite"/>
+                      </p:stCondLst>
+                      <p:childTnLst>
+                        <p:par>
+                          <p:cTn id="4" fill="hold">
+                            <p:stCondLst>
+                              <p:cond delay="0"/>
+                            </p:stCondLst>
+                            <p:childTnLst>
+                              <p:par>
+                                <p:cTn id="5" presetID="1" presetClass="entr" presetSubtype="0" fill="hold" nodeType="clickEffect">
+                                  <p:stCondLst>
+                                    <p:cond delay="0"/>
+                                  </p:stCondLst>
+                                  <p:childTnLst>
+                                    <p:set>
+                                      <p:cBhvr>
+                                        <p:cTn id="6" dur="1" fill="hold">
+                                          <p:stCondLst>
+                                            <p:cond delay="0"/>
+                                          </p:stCondLst>
+                                        </p:cTn>
+                                        <p:tgtEl>
+                                          <p:spTgt spid="3">
+                                            <p:txEl>
+                                              <p:pRg st="0" end="0"/>
+                                            </p:txEl>
+                                          </p:spTgt>
+                                        </p:tgtEl>
+                                        <p:attrNameLst>
+                                          <p:attrName>style.visibility</p:attrName>
+                                        </p:attrNameLst>
+                                      </p:cBhvr>
+                                      <p:to>
+                                        <p:strVal val="visible"/>
+                                      </p:to>
+                                    </p:set>
+                                  </p:childTnLst>
+                                </p:cTn>
+                              </p:par>
+                            </p:childTnLst>
+                          </p:cTn>
+                        </p:par>
+                      </p:childTnLst>
+                    </p:cTn>
+                  </p:par>
+                  <p:par>
+                    <p:cTn id="7" fill="hold">
+                      <p:stCondLst>
+                        <p:cond delay="indefinite"/>
+                      </p:stCondLst>
+                      <p:childTnLst>
+                        <p:par>
+                          <p:cTn id="8" fill="hold">
+                            <p:stCondLst>
+                              <p:cond delay="0"/>
+                            </p:stCondLst>
+                            <p:childTnLst>
+                              <p:par>
+                                <p:cTn id="9" presetID="1" presetClass="entr" presetSubtype="0" fill="hold" nodeType="clickEffect">
+                                  <p:stCondLst>
+                                    <p:cond delay="0"/>
+                                  </p:stCondLst>
+                                  <p:childTnLst>
+                                    <p:set>
+                                      <p:cBhvr>
+                                        <p:cTn id="10" dur="1" fill="hold">
+                                          <p:stCondLst>
+                                            <p:cond delay="0"/>
+                                          </p:stCondLst>
+                                        </p:cTn>
+                                        <p:tgtEl>
+                                          <p:spTgt spid="3">
+                                            <p:txEl>
+                                              <p:pRg st="1" end="1"/>
+                                            </p:txEl>
+                                          </p:spTgt>
+                                        </p:tgtEl>
+                                        <p:attrNameLst>
+                                          <p:attrName>style.visibility</p:attrName>
+                                        </p:attrNameLst>
+                                      </p:cBhvr>
+                                      <p:to>
+                                        <p:strVal val="visible"/>
+                                      </p:to>
+                                    </p:set>
+                                  </p:childTnLst>
+                                </p:cTn>
+                              </p:par>
+                            </p:childTnLst>
+                          </p:cTn>
+                        </p:par>
+                      </p:childTnLst>
+                    </p:cTn>
+                  </p:par>
+                  <p:par>
+                    <p:cTn id="11" fill="hold">
+                      <p:stCondLst>
+                        <p:cond delay="indefinite"/>
+                      </p:stCondLst>
+                      <p:childTnLst>
+                        <p:par>
+                          <p:cTn id="12" fill="hold">
+                            <p:stCondLst>
+                              <p:cond delay="0"/>
+                            </p:stCondLst>
+                            <p:childTnLst>
+                              <p:par>
+                                <p:cTn id="13" presetID="1" presetClass="entr" presetSubtype="0" fill="hold" nodeType="clickEffect">
+                                  <p:stCondLst>
+                                    <p:cond delay="0"/>
+                                  </p:stCondLst>
+                                  <p:childTnLst>
+                                    <p:set>
+                                      <p:cBhvr>
+                                        <p:cTn id="14" dur="1" fill="hold">
+                                          <p:stCondLst>
+                                            <p:cond delay="0"/>
+                                          </p:stCondLst>
+                                        </p:cTn>
+                                        <p:tgtEl>
+                                          <p:spTgt spid="3">
+                                            <p:txEl>
+                                              <p:pRg st="2" end="2"/>
+                                            </p:txEl>
+                                          </p:spTgt>
+                                        </p:tgtEl>
+                                        <p:attrNameLst>
+                                          <p:attrName>style.visibility</p:attrName>
+                                        </p:attrNameLst>
+                                      </p:cBhvr>
+                                      <p:to>
+                                        <p:strVal val="visible"/>
+                                      </p:to>
+                                    </p:set>
+                                  </p:childTnLst>
+                                </p:cTn>
+                              </p:par>
+                            </p:childTnLst>
+                          </p:cTn>
+                        </p:par>
+                      </p:childTnLst>
+                    </p:cTn>
+                  </p:par>
+                  <p:par>
+                    <p:cTn id="15" fill="hold">
+                      <p:stCondLst>
+                        <p:cond delay="indefinite"/>
+                      </p:stCondLst>
+                      <p:childTnLst>
+                        <p:par>
+                          <p:cTn id="16" fill="hold">
+                            <p:stCondLst>
+                              <p:cond delay="0"/>
+                            </p:stCondLst>
+                            <p:childTnLst>
+                              <p:par>
+                                <p:cTn id="17" presetID="1" presetClass="entr" presetSubtype="0" fill="hold" nodeType="clickEffect">
+                                  <p:stCondLst>
+                                    <p:cond delay="0"/>
+                                  </p:stCondLst>
+                                  <p:childTnLst>
+                                    <p:set>
+                                      <p:cBhvr>
+                                        <p:cTn id="18" dur="1" fill="hold">
+                                          <p:stCondLst>
+                                            <p:cond delay="0"/>
+                                          </p:stCondLst>
+                                        </p:cTn>
+                                        <p:tgtEl>
+                                          <p:spTgt spid="3">
+                                            <p:txEl>
+                                              <p:pRg st="3" end="3"/>
+                                            </p:txEl>
+                                          </p:spTgt>
+                                        </p:tgtEl>
+                                        <p:attrNameLst>
+                                          <p:attrName>style.visibility</p:attrName>
+                                        </p:attrNameLst>
+                                      </p:cBhvr>
+                                      <p:to>
+                                        <p:strVal val="visible"/>
+                                      </p:to>
+                                    </p:set>
+                                  </p:childTnLst>
+                                </p:cTn>
+                              </p:par>
+                            </p:childTnLst>
+                          </p:cTn>
+                        </p:par>
+                      </p:childTnLst>
+                    </p:cTn>
+                  </p:par>
+                </p:childTnLst>
+              </p:cTn>
+              <p:prevCondLst>
+                <p:cond evt="onPrev" delay="0">
+                  <p:tgtEl>
+                    <p:sldTgt/>
+                  </p:tgtEl>
+                </p:cond>
+              </p:prevCondLst>
+              <p:nextCondLst>
+                <p:cond evt="onNext" delay="0">
+                  <p:tgtEl>
+                    <p:sldTgt/>
+                  </p:tgtEl>
+                </p:cond>
+              </p:nextCondLst>
+            </p:seq>
+          </p:childTnLst>
+        </p:cTn>
+      </p:par>
+    </p:tnLst>
+  </p:timing>
 </p:sld>
 </file>
 
@@ -7425,6 +9472,182 @@
       <p:bldP spid="3" grpId="0" build="p"/>
     </p:bldLst>
   </p:timing>
+</p:sld>
+</file>
+
+<file path=ppt/slides/slide20.xml><?xml version="1.0" encoding="utf-8"?>
+<p:sld xmlns:a="http://schemas.openxmlformats.org/drawingml/2006/main" xmlns:r="http://schemas.openxmlformats.org/officeDocument/2006/relationships" xmlns:p="http://schemas.openxmlformats.org/presentationml/2006/main">
+  <p:cSld>
+    <p:spTree>
+      <p:nvGrpSpPr>
+        <p:cNvPr id="1" name=""/>
+        <p:cNvGrpSpPr/>
+        <p:nvPr/>
+      </p:nvGrpSpPr>
+      <p:grpSpPr>
+        <a:xfrm>
+          <a:off x="0" y="0"/>
+          <a:ext cx="0" cy="0"/>
+          <a:chOff x="0" y="0"/>
+          <a:chExt cx="0" cy="0"/>
+        </a:xfrm>
+      </p:grpSpPr>
+      <p:sp>
+        <p:nvSpPr>
+          <p:cNvPr id="2" name="Titre 1">
+            <a:extLst>
+              <a:ext uri="{FF2B5EF4-FFF2-40B4-BE49-F238E27FC236}">
+                <a16:creationId xmlns:a16="http://schemas.microsoft.com/office/drawing/2014/main" id="{35777357-6D6B-329C-FD55-4219A452CD87}"/>
+              </a:ext>
+            </a:extLst>
+          </p:cNvPr>
+          <p:cNvSpPr>
+            <a:spLocks noGrp="1"/>
+          </p:cNvSpPr>
+          <p:nvPr>
+            <p:ph type="title"/>
+          </p:nvPr>
+        </p:nvSpPr>
+        <p:spPr/>
+        <p:txBody>
+          <a:bodyPr>
+            <a:normAutofit/>
+          </a:bodyPr>
+          <a:lstStyle/>
+          <a:p>
+            <a:r>
+              <a:rPr lang="fr-FR" sz="5000" dirty="0"/>
+              <a:t>Contrôle de jobs dans le </a:t>
+            </a:r>
+            <a:r>
+              <a:rPr lang="fr-FR" sz="5000" i="1" dirty="0" err="1"/>
+              <a:t>shell</a:t>
+            </a:r>
+            <a:endParaRPr lang="fr-BE" sz="5000" i="1" dirty="0"/>
+          </a:p>
+        </p:txBody>
+      </p:sp>
+      <p:sp>
+        <p:nvSpPr>
+          <p:cNvPr id="3" name="Espace réservé du contenu 2">
+            <a:extLst>
+              <a:ext uri="{FF2B5EF4-FFF2-40B4-BE49-F238E27FC236}">
+                <a16:creationId xmlns:a16="http://schemas.microsoft.com/office/drawing/2014/main" id="{EA3B3CD5-2C2B-E575-559E-AA9DF216F3BA}"/>
+              </a:ext>
+            </a:extLst>
+          </p:cNvPr>
+          <p:cNvSpPr>
+            <a:spLocks noGrp="1"/>
+          </p:cNvSpPr>
+          <p:nvPr>
+            <p:ph idx="1"/>
+          </p:nvPr>
+        </p:nvSpPr>
+        <p:spPr/>
+        <p:txBody>
+          <a:bodyPr/>
+          <a:lstStyle/>
+          <a:p>
+            <a:endParaRPr lang="fr-BE" dirty="0"/>
+          </a:p>
+        </p:txBody>
+      </p:sp>
+      <p:sp>
+        <p:nvSpPr>
+          <p:cNvPr id="4" name="Espace réservé de la date 3">
+            <a:extLst>
+              <a:ext uri="{FF2B5EF4-FFF2-40B4-BE49-F238E27FC236}">
+                <a16:creationId xmlns:a16="http://schemas.microsoft.com/office/drawing/2014/main" id="{EC361936-FA0B-86E7-B29E-E4BCD0A9248A}"/>
+              </a:ext>
+            </a:extLst>
+          </p:cNvPr>
+          <p:cNvSpPr>
+            <a:spLocks noGrp="1"/>
+          </p:cNvSpPr>
+          <p:nvPr>
+            <p:ph type="dt" sz="half" idx="10"/>
+          </p:nvPr>
+        </p:nvSpPr>
+        <p:spPr/>
+        <p:txBody>
+          <a:bodyPr/>
+          <a:lstStyle/>
+          <a:p>
+            <a:fld id="{37AD5F8E-F96A-4AFD-A571-9DF5FE5D3317}" type="datetime1">
+              <a:rPr lang="fr-BE" smtClean="0"/>
+              <a:t>06-12-23</a:t>
+            </a:fld>
+            <a:endParaRPr lang="en-US"/>
+          </a:p>
+        </p:txBody>
+      </p:sp>
+      <p:sp>
+        <p:nvSpPr>
+          <p:cNvPr id="5" name="Espace réservé du pied de page 4">
+            <a:extLst>
+              <a:ext uri="{FF2B5EF4-FFF2-40B4-BE49-F238E27FC236}">
+                <a16:creationId xmlns:a16="http://schemas.microsoft.com/office/drawing/2014/main" id="{E0DD554C-8CE4-DB34-A529-28D0FDF967C3}"/>
+              </a:ext>
+            </a:extLst>
+          </p:cNvPr>
+          <p:cNvSpPr>
+            <a:spLocks noGrp="1"/>
+          </p:cNvSpPr>
+          <p:nvPr>
+            <p:ph type="ftr" sz="quarter" idx="11"/>
+          </p:nvPr>
+        </p:nvSpPr>
+        <p:spPr/>
+        <p:txBody>
+          <a:bodyPr/>
+          <a:lstStyle/>
+          <a:p>
+            <a:r>
+              <a:rPr lang="en-US"/>
+              <a:t>58093@etu.he2b.be</a:t>
+            </a:r>
+          </a:p>
+        </p:txBody>
+      </p:sp>
+      <p:sp>
+        <p:nvSpPr>
+          <p:cNvPr id="6" name="Espace réservé du numéro de diapositive 5">
+            <a:extLst>
+              <a:ext uri="{FF2B5EF4-FFF2-40B4-BE49-F238E27FC236}">
+                <a16:creationId xmlns:a16="http://schemas.microsoft.com/office/drawing/2014/main" id="{54035E64-3B8F-0309-1DC0-3776F66A71DB}"/>
+              </a:ext>
+            </a:extLst>
+          </p:cNvPr>
+          <p:cNvSpPr>
+            <a:spLocks noGrp="1"/>
+          </p:cNvSpPr>
+          <p:nvPr>
+            <p:ph type="sldNum" sz="quarter" idx="12"/>
+          </p:nvPr>
+        </p:nvSpPr>
+        <p:spPr/>
+        <p:txBody>
+          <a:bodyPr/>
+          <a:lstStyle/>
+          <a:p>
+            <a:fld id="{719D7796-F675-488F-AC46-C88938C80352}" type="slidenum">
+              <a:rPr lang="en-US" smtClean="0"/>
+              <a:t>20</a:t>
+            </a:fld>
+            <a:endParaRPr lang="en-US"/>
+          </a:p>
+        </p:txBody>
+      </p:sp>
+    </p:spTree>
+    <p:extLst>
+      <p:ext uri="{BB962C8B-B14F-4D97-AF65-F5344CB8AC3E}">
+        <p14:creationId xmlns:p14="http://schemas.microsoft.com/office/powerpoint/2010/main" val="2530843585"/>
+      </p:ext>
+    </p:extLst>
+  </p:cSld>
+  <p:clrMapOvr>
+    <a:masterClrMapping/>
+  </p:clrMapOvr>
 </p:sld>
 </file>
 

</xml_diff>